<commit_message>
Did some stuff. Should be ready for more writing.
</commit_message>
<xml_diff>
--- a/Probcode Presentation.pptx
+++ b/Probcode Presentation.pptx
@@ -234,7 +234,7 @@
             <a:fld id="{727F59EA-C702-4ECC-9A29-CD25AEF53C21}" type="datetimeFigureOut">
               <a:rPr lang="en-US" smtClean="0"/>
               <a:pPr/>
-              <a:t>7/4/2013</a:t>
+              <a:t>7/5/2013</a:t>
             </a:fld>
             <a:endParaRPr lang="en-US"/>
           </a:p>
@@ -630,7 +630,13 @@
           <a:p>
             <a:r>
               <a:rPr lang="en-CA" dirty="0" smtClean="0"/>
-              <a:t>This is roughly equivalent to transmitting something over a rate-limited</a:t>
+              <a:t>This is roughly equivalent to transmitting</a:t>
+            </a:r>
+          </a:p>
+          <a:p>
+            <a:r>
+              <a:rPr lang="en-CA" dirty="0" smtClean="0"/>
+              <a:t>something over a rate-limited</a:t>
             </a:r>
             <a:r>
               <a:rPr lang="en-CA" baseline="0" dirty="0" smtClean="0"/>
@@ -892,7 +898,13 @@
           <a:p>
             <a:r>
               <a:rPr lang="en-CA" dirty="0" smtClean="0"/>
-              <a:t>The differences are so small the are barely</a:t>
+              <a:t>The differences are so small they</a:t>
+            </a:r>
+          </a:p>
+          <a:p>
+            <a:r>
+              <a:rPr lang="en-CA" dirty="0" smtClean="0"/>
+              <a:t>are barely</a:t>
             </a:r>
             <a:r>
               <a:rPr lang="en-CA" baseline="0" dirty="0" smtClean="0"/>
@@ -982,13 +994,23 @@
           <a:p>
             <a:r>
               <a:rPr lang="en-CA" dirty="0" smtClean="0"/>
-              <a:t>You can see some variation</a:t>
-            </a:r>
-            <a:r>
-              <a:rPr lang="en-CA" baseline="0" dirty="0" smtClean="0"/>
-              <a:t>, but overall the match is very good. One would have an exceptionally hard time telling the two apart from these statistics.</a:t>
-            </a:r>
-            <a:endParaRPr lang="en-US" dirty="0"/>
+              <a:t>Overall match is very good</a:t>
+            </a:r>
+          </a:p>
+          <a:p>
+            <a:r>
+              <a:rPr lang="en-CA" dirty="0" smtClean="0"/>
+              <a:t>Some variation</a:t>
+            </a:r>
+          </a:p>
+          <a:p>
+            <a:endParaRPr lang="en-CA" dirty="0" smtClean="0"/>
+          </a:p>
+          <a:p>
+            <a:r>
+              <a:rPr lang="en-CA" dirty="0" smtClean="0"/>
+              <a:t>Statistically difficult to tell them apart</a:t>
+            </a:r>
           </a:p>
         </p:txBody>
       </p:sp>
@@ -1166,7 +1188,13 @@
             </a:r>
             <a:r>
               <a:rPr lang="en-CA" baseline="0" dirty="0" smtClean="0"/>
-              <a:t> generation can work really well given appropriate input material.</a:t>
+              <a:t> generation can work</a:t>
+            </a:r>
+          </a:p>
+          <a:p>
+            <a:r>
+              <a:rPr lang="en-CA" baseline="0" dirty="0" smtClean="0"/>
+              <a:t>really well given appropriate input material.</a:t>
             </a:r>
             <a:endParaRPr lang="en-US" dirty="0"/>
           </a:p>
@@ -1428,7 +1456,22 @@
           <a:p>
             <a:r>
               <a:rPr lang="en-CA" dirty="0" smtClean="0"/>
-              <a:t>Maybe someone wrote feelings poetry after a few too many beers? Getting better.</a:t>
+              <a:t>Maybe someone wrote feelings</a:t>
+            </a:r>
+          </a:p>
+          <a:p>
+            <a:r>
+              <a:rPr lang="en-CA" dirty="0" smtClean="0"/>
+              <a:t>poetry after a few too many beers?</a:t>
+            </a:r>
+          </a:p>
+          <a:p>
+            <a:endParaRPr lang="en-CA" dirty="0" smtClean="0"/>
+          </a:p>
+          <a:p>
+            <a:r>
+              <a:rPr lang="en-CA" dirty="0" smtClean="0"/>
+              <a:t>Getting better.</a:t>
             </a:r>
             <a:endParaRPr lang="en-US" dirty="0"/>
           </a:p>
@@ -1542,7 +1585,17 @@
             </a:pPr>
             <a:r>
               <a:rPr lang="en-CA" dirty="0" smtClean="0"/>
-              <a:t>Input uniform distribution, get out some other </a:t>
+              <a:t>Input uniform distribution</a:t>
+            </a:r>
+          </a:p>
+          <a:p>
+            <a:pPr lvl="1">
+              <a:buFontTx/>
+              <a:buChar char="-"/>
+            </a:pPr>
+            <a:r>
+              <a:rPr lang="en-CA" dirty="0" smtClean="0"/>
+              <a:t>get out some other </a:t>
             </a:r>
             <a:r>
               <a:rPr lang="en-CA" dirty="0" err="1" smtClean="0"/>
@@ -1552,6 +1605,12 @@
               <a:rPr lang="en-CA" baseline="0" dirty="0" smtClean="0"/>
               <a:t> defined by the CDF you inverted</a:t>
             </a:r>
+          </a:p>
+          <a:p>
+            <a:pPr lvl="1">
+              <a:buFontTx/>
+              <a:buNone/>
+            </a:pPr>
             <a:endParaRPr lang="en-CA" dirty="0" smtClean="0"/>
           </a:p>
           <a:p>
@@ -1575,7 +1634,27 @@
             </a:pPr>
             <a:r>
               <a:rPr lang="en-CA" dirty="0" smtClean="0"/>
-              <a:t>The frequency of a word is inversely proportional to its rank in the frequency</a:t>
+              <a:t>The frequency of a word is </a:t>
+            </a:r>
+          </a:p>
+          <a:p>
+            <a:pPr lvl="1">
+              <a:buFontTx/>
+              <a:buChar char="-"/>
+            </a:pPr>
+            <a:r>
+              <a:rPr lang="en-CA" dirty="0" smtClean="0"/>
+              <a:t>inversely proportional to its </a:t>
+            </a:r>
+          </a:p>
+          <a:p>
+            <a:pPr lvl="1">
+              <a:buFontTx/>
+              <a:buChar char="-"/>
+            </a:pPr>
+            <a:r>
+              <a:rPr lang="en-CA" dirty="0" smtClean="0"/>
+              <a:t>rank in the frequency</a:t>
             </a:r>
             <a:r>
               <a:rPr lang="en-CA" baseline="0" dirty="0" smtClean="0"/>
@@ -1669,7 +1748,13 @@
             </a:r>
             <a:r>
               <a:rPr lang="en-CA" baseline="0" dirty="0" smtClean="0"/>
-              <a:t> medium, and large inputs. 100, 10000 and 100000 bytes respectively.</a:t>
+              <a:t> medium, and large inputs.</a:t>
+            </a:r>
+          </a:p>
+          <a:p>
+            <a:r>
+              <a:rPr lang="en-CA" baseline="0" dirty="0" smtClean="0"/>
+              <a:t>100, 10000 and 100000 bytes respectively.</a:t>
             </a:r>
             <a:endParaRPr lang="en-US" dirty="0"/>
           </a:p>
@@ -1837,7 +1922,16 @@
           <a:p>
             <a:r>
               <a:rPr lang="en-CA" dirty="0" smtClean="0"/>
-              <a:t>You can see it tighten up. The large corpus follows the trends of </a:t>
+              <a:t>You can see it tighten up.</a:t>
+            </a:r>
+          </a:p>
+          <a:p>
+            <a:endParaRPr lang="en-CA" dirty="0" smtClean="0"/>
+          </a:p>
+          <a:p>
+            <a:r>
+              <a:rPr lang="en-CA" dirty="0" smtClean="0"/>
+              <a:t>The large corpus follows the trends of </a:t>
             </a:r>
             <a:r>
               <a:rPr lang="en-CA" dirty="0" err="1" smtClean="0"/>
@@ -1931,7 +2025,16 @@
           <a:p>
             <a:r>
               <a:rPr lang="en-CA" dirty="0" smtClean="0"/>
-              <a:t>Everything we’ve done so far we can undo! This is a completely reversible encoding!</a:t>
+              <a:t>Everything we’ve done so far we can undo!</a:t>
+            </a:r>
+          </a:p>
+          <a:p>
+            <a:endParaRPr lang="en-CA" dirty="0" smtClean="0"/>
+          </a:p>
+          <a:p>
+            <a:r>
+              <a:rPr lang="en-CA" dirty="0" smtClean="0"/>
+              <a:t>This is a completely reversible encoding!</a:t>
             </a:r>
             <a:endParaRPr lang="en-US" dirty="0"/>
           </a:p>
@@ -2267,7 +2370,13 @@
           <a:p>
             <a:r>
               <a:rPr lang="en-CA" dirty="0" smtClean="0"/>
-              <a:t>The reason for a high entropy source will be clear shortly</a:t>
+              <a:t>The reason for a high entropy </a:t>
+            </a:r>
+          </a:p>
+          <a:p>
+            <a:r>
+              <a:rPr lang="en-CA" dirty="0" smtClean="0"/>
+              <a:t>source will be clear shortly</a:t>
             </a:r>
             <a:endParaRPr lang="en-US" dirty="0"/>
           </a:p>
@@ -2435,8 +2544,37 @@
           <a:p>
             <a:r>
               <a:rPr lang="en-CA" dirty="0" smtClean="0"/>
-              <a:t>The implication here is that the most probably output symbol cannot have probability greater than 50%, or we won’t be able to match it.</a:t>
-            </a:r>
+              <a:t>The implication here is that the</a:t>
+            </a:r>
+          </a:p>
+          <a:p>
+            <a:r>
+              <a:rPr lang="en-CA" dirty="0" smtClean="0"/>
+              <a:t>most probably output symbol cannot</a:t>
+            </a:r>
+          </a:p>
+          <a:p>
+            <a:r>
+              <a:rPr lang="en-CA" dirty="0" smtClean="0"/>
+              <a:t>have probability greater than 50%,</a:t>
+            </a:r>
+          </a:p>
+          <a:p>
+            <a:r>
+              <a:rPr lang="en-CA" dirty="0" smtClean="0"/>
+              <a:t>or we won’t be able</a:t>
+            </a:r>
+            <a:r>
+              <a:rPr lang="en-CA" baseline="0" dirty="0" smtClean="0"/>
+              <a:t> to give it enough</a:t>
+            </a:r>
+          </a:p>
+          <a:p>
+            <a:r>
+              <a:rPr lang="en-CA" baseline="0" dirty="0" smtClean="0"/>
+              <a:t>opportunities.</a:t>
+            </a:r>
+            <a:endParaRPr lang="en-CA" dirty="0" smtClean="0"/>
           </a:p>
           <a:p>
             <a:endParaRPr lang="en-CA" dirty="0" smtClean="0"/>
@@ -2448,7 +2586,19 @@
             </a:r>
             <a:r>
               <a:rPr lang="en-CA" baseline="0" dirty="0" smtClean="0"/>
-              <a:t> mapping has a considerably impact on output distribution for a reasonable savings in output size (20%-</a:t>
+              <a:t> mapping has a considerable</a:t>
+            </a:r>
+          </a:p>
+          <a:p>
+            <a:r>
+              <a:rPr lang="en-CA" baseline="0" dirty="0" smtClean="0"/>
+              <a:t>impact on output distribution for a reasonable</a:t>
+            </a:r>
+          </a:p>
+          <a:p>
+            <a:r>
+              <a:rPr lang="en-CA" baseline="0" dirty="0" smtClean="0"/>
+              <a:t>savings in output size (20%-</a:t>
             </a:r>
             <a:r>
               <a:rPr lang="en-CA" baseline="0" dirty="0" err="1" smtClean="0"/>
@@ -2911,7 +3061,16 @@
           <a:p>
             <a:r>
               <a:rPr lang="en-CA" dirty="0" smtClean="0"/>
-              <a:t>Note the systemic differences. They are ALL</a:t>
+              <a:t>Note the systemic differences. </a:t>
+            </a:r>
+          </a:p>
+          <a:p>
+            <a:endParaRPr lang="en-CA" dirty="0" smtClean="0"/>
+          </a:p>
+          <a:p>
+            <a:r>
+              <a:rPr lang="en-CA" dirty="0" smtClean="0"/>
+              <a:t>They are ALL</a:t>
             </a:r>
             <a:r>
               <a:rPr lang="en-CA" baseline="0" dirty="0" smtClean="0"/>
@@ -3001,7 +3160,22 @@
           <a:p>
             <a:r>
               <a:rPr lang="en-CA" dirty="0" smtClean="0"/>
-              <a:t>Took the original distribution specification, and encoded a few bytes. Then encoded ten million bytes of /dev/</a:t>
+              <a:t>Took the original distribution specification,</a:t>
+            </a:r>
+          </a:p>
+          <a:p>
+            <a:r>
+              <a:rPr lang="en-CA" dirty="0" smtClean="0"/>
+              <a:t>and encoded a few bytes.</a:t>
+            </a:r>
+          </a:p>
+          <a:p>
+            <a:endParaRPr lang="en-CA" dirty="0" smtClean="0"/>
+          </a:p>
+          <a:p>
+            <a:r>
+              <a:rPr lang="en-CA" dirty="0" smtClean="0"/>
+              <a:t>Then encoded ten million bytes of /dev/</a:t>
             </a:r>
             <a:r>
               <a:rPr lang="en-CA" dirty="0" err="1" smtClean="0"/>
@@ -3009,7 +3183,19 @@
             </a:r>
             <a:r>
               <a:rPr lang="en-CA" dirty="0" smtClean="0"/>
-              <a:t>, converted that into a distribution specification, and encoded the same few bytes as with the original.</a:t>
+              <a:t>,</a:t>
+            </a:r>
+          </a:p>
+          <a:p>
+            <a:r>
+              <a:rPr lang="en-CA" dirty="0" smtClean="0"/>
+              <a:t>converted that into a distribution specification, </a:t>
+            </a:r>
+          </a:p>
+          <a:p>
+            <a:r>
+              <a:rPr lang="en-CA" dirty="0" smtClean="0"/>
+              <a:t>and encoded the same few bytes as with the original.</a:t>
             </a:r>
           </a:p>
           <a:p>
@@ -3018,7 +3204,11 @@
           <a:p>
             <a:r>
               <a:rPr lang="en-CA" dirty="0" smtClean="0"/>
-              <a:t>Not everything is wrong, but enough.</a:t>
+              <a:t>Not everything is wrong, but enough</a:t>
+            </a:r>
+            <a:r>
+              <a:rPr lang="en-CA" baseline="0" dirty="0" smtClean="0"/>
+              <a:t> and soon enough.</a:t>
             </a:r>
             <a:endParaRPr lang="en-US" dirty="0"/>
           </a:p>
@@ -3198,7 +3388,19 @@
             </a:r>
             <a:r>
               <a:rPr lang="en-CA" baseline="0" dirty="0" smtClean="0"/>
-              <a:t> and 10^4 byte samples to demonstrate that shorter amounts of text demonstrate more variability in error.</a:t>
+              <a:t> and 10^4 byte samples</a:t>
+            </a:r>
+          </a:p>
+          <a:p>
+            <a:r>
+              <a:rPr lang="en-CA" baseline="0" dirty="0" smtClean="0"/>
+              <a:t>to demonstrate that shorter amounts of</a:t>
+            </a:r>
+          </a:p>
+          <a:p>
+            <a:r>
+              <a:rPr lang="en-CA" baseline="0" dirty="0" smtClean="0"/>
+              <a:t>text demonstrate more variability in error.</a:t>
             </a:r>
           </a:p>
           <a:p>
@@ -3292,7 +3494,16 @@
           <a:p>
             <a:r>
               <a:rPr lang="en-CA" dirty="0" smtClean="0"/>
-              <a:t>A closer view of one section. We can see how close everything</a:t>
+              <a:t>A closer view of one section.</a:t>
+            </a:r>
+          </a:p>
+          <a:p>
+            <a:endParaRPr lang="en-CA" dirty="0" smtClean="0"/>
+          </a:p>
+          <a:p>
+            <a:r>
+              <a:rPr lang="en-CA" dirty="0" smtClean="0"/>
+              <a:t>We can see how close everything</a:t>
             </a:r>
             <a:r>
               <a:rPr lang="en-CA" baseline="0" dirty="0" smtClean="0"/>
@@ -3322,15 +3533,53 @@
             </a:pPr>
             <a:r>
               <a:rPr lang="en-CA" baseline="0" dirty="0" smtClean="0"/>
-              <a:t>Note that even though it is a sample of 10^6 bytes of </a:t>
-            </a:r>
-            <a:r>
-              <a:rPr lang="en-CA" baseline="0" dirty="0" err="1" smtClean="0"/>
-              <a:t>intput</a:t>
-            </a:r>
+              <a:t>Note that even though it is a sample</a:t>
+            </a:r>
+          </a:p>
+          <a:p>
+            <a:pPr marL="0" marR="0" indent="0" algn="l" defTabSz="914400" rtl="0" eaLnBrk="1" fontAlgn="auto" latinLnBrk="0" hangingPunct="1">
+              <a:lnSpc>
+                <a:spcPct val="100000"/>
+              </a:lnSpc>
+              <a:spcBef>
+                <a:spcPts val="0"/>
+              </a:spcBef>
+              <a:spcAft>
+                <a:spcPts val="0"/>
+              </a:spcAft>
+              <a:buClrTx/>
+              <a:buSzTx/>
+              <a:buFontTx/>
+              <a:buNone/>
+              <a:tabLst/>
+              <a:defRPr/>
+            </a:pPr>
             <a:r>
               <a:rPr lang="en-CA" baseline="0" dirty="0" smtClean="0"/>
-              <a:t>, it doesn’t match as well as the ‘real’ 10^6 sample.</a:t>
+              <a:t>of 10^6 bytes of input, it doesn’t match</a:t>
+            </a:r>
+          </a:p>
+          <a:p>
+            <a:pPr marL="0" marR="0" indent="0" algn="l" defTabSz="914400" rtl="0" eaLnBrk="1" fontAlgn="auto" latinLnBrk="0" hangingPunct="1">
+              <a:lnSpc>
+                <a:spcPct val="100000"/>
+              </a:lnSpc>
+              <a:spcBef>
+                <a:spcPts val="0"/>
+              </a:spcBef>
+              <a:spcAft>
+                <a:spcPts val="0"/>
+              </a:spcAft>
+              <a:buClrTx/>
+              <a:buSzTx/>
+              <a:buFontTx/>
+              <a:buNone/>
+              <a:tabLst/>
+              <a:defRPr/>
+            </a:pPr>
+            <a:r>
+              <a:rPr lang="en-CA" baseline="0" dirty="0" smtClean="0"/>
+              <a:t>as well as the ‘real’ 10^6 sample.</a:t>
             </a:r>
           </a:p>
           <a:p>
@@ -3339,7 +3588,19 @@
           <a:p>
             <a:r>
               <a:rPr lang="en-CA" baseline="0" dirty="0" smtClean="0"/>
-              <a:t>The 10^6 adjusted plot is covering the 10^5 byte plot, but you can just barely make out a sliver of the 10^5 byte plot behind it.</a:t>
+              <a:t>The 10^6 adjusted plot is covering the</a:t>
+            </a:r>
+          </a:p>
+          <a:p>
+            <a:r>
+              <a:rPr lang="en-CA" baseline="0" dirty="0" smtClean="0"/>
+              <a:t>10^5 byte plot, but you can just barely</a:t>
+            </a:r>
+          </a:p>
+          <a:p>
+            <a:r>
+              <a:rPr lang="en-CA" baseline="0" dirty="0" smtClean="0"/>
+              <a:t>make out a sliver of the 10^5 byte plot behind it.</a:t>
             </a:r>
           </a:p>
         </p:txBody>
@@ -3865,7 +4126,7 @@
           <a:p>
             <a:r>
               <a:rPr lang="en-CA" dirty="0" smtClean="0"/>
-              <a:t>-Note that it follows </a:t>
+              <a:t>Note that it follows </a:t>
             </a:r>
             <a:r>
               <a:rPr lang="en-CA" dirty="0" err="1" smtClean="0"/>
@@ -3877,7 +4138,22 @@
             </a:r>
             <a:r>
               <a:rPr lang="en-CA" baseline="0" dirty="0" smtClean="0"/>
-              <a:t> but doesn’t actually mirror it. There are marked differences.</a:t>
+              <a:t> </a:t>
+            </a:r>
+          </a:p>
+          <a:p>
+            <a:r>
+              <a:rPr lang="en-CA" baseline="0" dirty="0" smtClean="0"/>
+              <a:t>but doesn’t actually mirror it. </a:t>
+            </a:r>
+          </a:p>
+          <a:p>
+            <a:endParaRPr lang="en-CA" baseline="0" dirty="0" smtClean="0"/>
+          </a:p>
+          <a:p>
+            <a:r>
+              <a:rPr lang="en-CA" baseline="0" dirty="0" smtClean="0"/>
+              <a:t>There are marked differences.</a:t>
             </a:r>
           </a:p>
           <a:p>
@@ -3965,25 +4241,46 @@
           <a:p>
             <a:pPr>
               <a:buFontTx/>
-              <a:buChar char="-"/>
+              <a:buNone/>
             </a:pPr>
             <a:r>
               <a:rPr lang="en-CA" dirty="0" smtClean="0"/>
-              <a:t> I chose iodine</a:t>
-            </a:r>
-            <a:r>
-              <a:rPr lang="en-CA" baseline="0" dirty="0" smtClean="0"/>
-              <a:t> but all tunnel software exhibits the same kind of behaviour </a:t>
-            </a:r>
+              <a:t>I chose iodine</a:t>
+            </a:r>
+            <a:endParaRPr lang="en-CA" baseline="0" dirty="0" smtClean="0"/>
           </a:p>
           <a:p>
             <a:pPr>
               <a:buFontTx/>
-              <a:buChar char="-"/>
+              <a:buNone/>
             </a:pPr>
+            <a:endParaRPr lang="en-CA" baseline="0" dirty="0" smtClean="0"/>
+          </a:p>
+          <a:p>
+            <a:pPr>
+              <a:buFontTx/>
+              <a:buNone/>
+            </a:pPr>
             <a:r>
               <a:rPr lang="en-CA" baseline="0" dirty="0" smtClean="0"/>
-              <a:t>This plot is deception; it marginalizes the differences. Iodine appears to match for a good potion of the characters with only a few deviants but...</a:t>
+              <a:t>This plot is deceptive</a:t>
+            </a:r>
+          </a:p>
+          <a:p>
+            <a:pPr>
+              <a:buFontTx/>
+              <a:buNone/>
+            </a:pPr>
+            <a:endParaRPr lang="en-CA" baseline="0" dirty="0" smtClean="0"/>
+          </a:p>
+          <a:p>
+            <a:pPr>
+              <a:buFontTx/>
+              <a:buNone/>
+            </a:pPr>
+            <a:r>
+              <a:rPr lang="en-CA" baseline="0" dirty="0" smtClean="0"/>
+              <a:t>Apparently only a few deviants</a:t>
             </a:r>
             <a:endParaRPr lang="en-US" dirty="0"/>
           </a:p>
@@ -4069,7 +4366,13 @@
           <a:p>
             <a:r>
               <a:rPr lang="en-CA" dirty="0" smtClean="0"/>
-              <a:t>Easily discerned using a number of different classifiers or statistics.</a:t>
+              <a:t>Easily discerned using a number</a:t>
+            </a:r>
+          </a:p>
+          <a:p>
+            <a:r>
+              <a:rPr lang="en-CA" dirty="0" smtClean="0"/>
+              <a:t>of different classifiers or statistics.</a:t>
             </a:r>
             <a:endParaRPr lang="en-US" dirty="0"/>
           </a:p>
@@ -4236,14 +4539,36 @@
           <a:lstStyle/>
           <a:p>
             <a:r>
+              <a:rPr lang="en-CA" dirty="0" err="1" smtClean="0"/>
+              <a:t>CDf</a:t>
+            </a:r>
+            <a:r>
               <a:rPr lang="en-CA" dirty="0" smtClean="0"/>
-              <a:t>- Except we need</a:t>
+              <a:t> </a:t>
+            </a:r>
+            <a:r>
+              <a:rPr lang="en-CA" dirty="0" err="1" smtClean="0"/>
+              <a:t>bijective</a:t>
             </a:r>
             <a:r>
               <a:rPr lang="en-CA" baseline="0" dirty="0" smtClean="0"/>
-              <a:t> to be able to reverse the operation somehow.</a:t>
-            </a:r>
-            <a:endParaRPr lang="en-US" dirty="0"/>
+              <a:t> from domain to [0,1]</a:t>
+            </a:r>
+          </a:p>
+          <a:p>
+            <a:r>
+              <a:rPr lang="en-CA" baseline="0" dirty="0" smtClean="0"/>
+              <a:t>So invertible</a:t>
+            </a:r>
+          </a:p>
+          <a:p>
+            <a:endParaRPr lang="en-CA" baseline="0" dirty="0" smtClean="0"/>
+          </a:p>
+          <a:p>
+            <a:r>
+              <a:rPr lang="en-CA" baseline="0" dirty="0" smtClean="0"/>
+              <a:t>But not normally computable.</a:t>
+            </a:r>
           </a:p>
         </p:txBody>
       </p:sp>
@@ -4461,7 +4786,7 @@
             <a:fld id="{72B61E14-A7B0-4FAB-ADEA-2D5B0091074B}" type="datetimeFigureOut">
               <a:rPr lang="en-US" smtClean="0"/>
               <a:pPr/>
-              <a:t>7/4/2013</a:t>
+              <a:t>7/5/2013</a:t>
             </a:fld>
             <a:endParaRPr lang="en-US" dirty="0"/>
           </a:p>
@@ -4628,7 +4953,7 @@
             <a:fld id="{72B61E14-A7B0-4FAB-ADEA-2D5B0091074B}" type="datetimeFigureOut">
               <a:rPr lang="en-US" smtClean="0"/>
               <a:pPr/>
-              <a:t>7/4/2013</a:t>
+              <a:t>7/5/2013</a:t>
             </a:fld>
             <a:endParaRPr lang="en-US" dirty="0"/>
           </a:p>
@@ -4805,7 +5130,7 @@
             <a:fld id="{72B61E14-A7B0-4FAB-ADEA-2D5B0091074B}" type="datetimeFigureOut">
               <a:rPr lang="en-US" smtClean="0"/>
               <a:pPr/>
-              <a:t>7/4/2013</a:t>
+              <a:t>7/5/2013</a:t>
             </a:fld>
             <a:endParaRPr lang="en-US" dirty="0"/>
           </a:p>
@@ -4972,7 +5297,7 @@
             <a:fld id="{72B61E14-A7B0-4FAB-ADEA-2D5B0091074B}" type="datetimeFigureOut">
               <a:rPr lang="en-US" smtClean="0"/>
               <a:pPr/>
-              <a:t>7/4/2013</a:t>
+              <a:t>7/5/2013</a:t>
             </a:fld>
             <a:endParaRPr lang="en-US" dirty="0"/>
           </a:p>
@@ -5215,7 +5540,7 @@
             <a:fld id="{72B61E14-A7B0-4FAB-ADEA-2D5B0091074B}" type="datetimeFigureOut">
               <a:rPr lang="en-US" smtClean="0"/>
               <a:pPr/>
-              <a:t>7/4/2013</a:t>
+              <a:t>7/5/2013</a:t>
             </a:fld>
             <a:endParaRPr lang="en-US" dirty="0"/>
           </a:p>
@@ -5500,7 +5825,7 @@
             <a:fld id="{72B61E14-A7B0-4FAB-ADEA-2D5B0091074B}" type="datetimeFigureOut">
               <a:rPr lang="en-US" smtClean="0"/>
               <a:pPr/>
-              <a:t>7/4/2013</a:t>
+              <a:t>7/5/2013</a:t>
             </a:fld>
             <a:endParaRPr lang="en-US" dirty="0"/>
           </a:p>
@@ -5919,7 +6244,7 @@
             <a:fld id="{72B61E14-A7B0-4FAB-ADEA-2D5B0091074B}" type="datetimeFigureOut">
               <a:rPr lang="en-US" smtClean="0"/>
               <a:pPr/>
-              <a:t>7/4/2013</a:t>
+              <a:t>7/5/2013</a:t>
             </a:fld>
             <a:endParaRPr lang="en-US" dirty="0"/>
           </a:p>
@@ -6034,7 +6359,7 @@
             <a:fld id="{72B61E14-A7B0-4FAB-ADEA-2D5B0091074B}" type="datetimeFigureOut">
               <a:rPr lang="en-US" smtClean="0"/>
               <a:pPr/>
-              <a:t>7/4/2013</a:t>
+              <a:t>7/5/2013</a:t>
             </a:fld>
             <a:endParaRPr lang="en-US" dirty="0"/>
           </a:p>
@@ -6126,7 +6451,7 @@
             <a:fld id="{72B61E14-A7B0-4FAB-ADEA-2D5B0091074B}" type="datetimeFigureOut">
               <a:rPr lang="en-US" smtClean="0"/>
               <a:pPr/>
-              <a:t>7/4/2013</a:t>
+              <a:t>7/5/2013</a:t>
             </a:fld>
             <a:endParaRPr lang="en-US" dirty="0"/>
           </a:p>
@@ -6400,7 +6725,7 @@
             <a:fld id="{72B61E14-A7B0-4FAB-ADEA-2D5B0091074B}" type="datetimeFigureOut">
               <a:rPr lang="en-US" smtClean="0"/>
               <a:pPr/>
-              <a:t>7/4/2013</a:t>
+              <a:t>7/5/2013</a:t>
             </a:fld>
             <a:endParaRPr lang="en-US" dirty="0"/>
           </a:p>
@@ -6650,7 +6975,7 @@
             <a:fld id="{72B61E14-A7B0-4FAB-ADEA-2D5B0091074B}" type="datetimeFigureOut">
               <a:rPr lang="en-US" smtClean="0"/>
               <a:pPr/>
-              <a:t>7/4/2013</a:t>
+              <a:t>7/5/2013</a:t>
             </a:fld>
             <a:endParaRPr lang="en-US" dirty="0"/>
           </a:p>
@@ -6860,7 +7185,7 @@
             <a:fld id="{72B61E14-A7B0-4FAB-ADEA-2D5B0091074B}" type="datetimeFigureOut">
               <a:rPr lang="en-US" smtClean="0"/>
               <a:pPr/>
-              <a:t>7/4/2013</a:t>
+              <a:t>7/5/2013</a:t>
             </a:fld>
             <a:endParaRPr lang="en-US" dirty="0"/>
           </a:p>
@@ -7266,12 +7591,66 @@
         </p:nvSpPr>
         <p:spPr/>
         <p:txBody>
-          <a:bodyPr/>
+          <a:bodyPr>
+            <a:normAutofit/>
+          </a:bodyPr>
           <a:lstStyle/>
           <a:p>
             <a:r>
               <a:rPr lang="en-CA" dirty="0" smtClean="0"/>
-              <a:t>Encoding data for quantitative and qualitative properties through greedy algorithms for no reason at all</a:t>
+              <a:t>Encoding data for quantitative and qualitative properties through greedy algorithms for no reason at </a:t>
+            </a:r>
+            <a:r>
+              <a:rPr lang="en-CA" dirty="0" smtClean="0"/>
+              <a:t>all</a:t>
+            </a:r>
+          </a:p>
+          <a:p>
+            <a:endParaRPr lang="en-CA" dirty="0" smtClean="0"/>
+          </a:p>
+          <a:p>
+            <a:endParaRPr lang="en-US" dirty="0"/>
+          </a:p>
+        </p:txBody>
+      </p:sp>
+      <p:sp>
+        <p:nvSpPr>
+          <p:cNvPr id="4" name="TextBox 3"/>
+          <p:cNvSpPr txBox="1"/>
+          <p:nvPr/>
+        </p:nvSpPr>
+        <p:spPr>
+          <a:xfrm>
+            <a:off x="6876256" y="5949280"/>
+            <a:ext cx="1967205" cy="646331"/>
+          </a:xfrm>
+          <a:prstGeom prst="rect">
+            <a:avLst/>
+          </a:prstGeom>
+          <a:noFill/>
+        </p:spPr>
+        <p:txBody>
+          <a:bodyPr wrap="none" rtlCol="0">
+            <a:spAutoFit/>
+          </a:bodyPr>
+          <a:lstStyle/>
+          <a:p>
+            <a:r>
+              <a:rPr lang="en-CA" dirty="0" smtClean="0"/>
+              <a:t>Michael </a:t>
+            </a:r>
+            <a:r>
+              <a:rPr lang="en-CA" dirty="0" err="1" smtClean="0"/>
+              <a:t>Himbeault</a:t>
+            </a:r>
+            <a:endParaRPr lang="en-CA" dirty="0" smtClean="0"/>
+          </a:p>
+          <a:p>
+            <a:r>
+              <a:rPr lang="en-CA" dirty="0" smtClean="0">
+                <a:hlinkClick r:id="rId3"/>
+              </a:rPr>
+              <a:t>mike@riebart.ca</a:t>
             </a:r>
             <a:endParaRPr lang="en-US" dirty="0"/>
           </a:p>
@@ -8159,7 +8538,9 @@
         </p:nvSpPr>
         <p:spPr/>
         <p:txBody>
-          <a:bodyPr/>
+          <a:bodyPr>
+            <a:normAutofit lnSpcReduction="10000"/>
+          </a:bodyPr>
           <a:lstStyle/>
           <a:p>
             <a:r>
@@ -8173,23 +8554,14 @@
           <a:p>
             <a:r>
               <a:rPr lang="en-CA" dirty="0" smtClean="0"/>
-              <a:t>Generated the transition data from Sherlock Holmes, Huckleberry Finn, </a:t>
-            </a:r>
+              <a:t>Generated the transition data from Sherlock Holmes, Huckleberry Finn, the complete works of Alexander Dumas, and Dante’s Divine Comedy.</a:t>
+            </a:r>
+          </a:p>
+          <a:p>
+            <a:pPr lvl="1"/>
             <a:r>
               <a:rPr lang="en-CA" dirty="0" smtClean="0"/>
-              <a:t>the complete works of </a:t>
-            </a:r>
-            <a:r>
-              <a:rPr lang="en-CA" smtClean="0"/>
-              <a:t>Alexander Dumas, </a:t>
-            </a:r>
-            <a:r>
-              <a:rPr lang="en-CA" smtClean="0"/>
-              <a:t>and </a:t>
-            </a:r>
-            <a:r>
-              <a:rPr lang="en-CA" dirty="0" smtClean="0"/>
-              <a:t>Dante’s Divine Comedy.</a:t>
+              <a:t>2.2 million words total.</a:t>
             </a:r>
             <a:endParaRPr lang="en-US" dirty="0"/>
           </a:p>
@@ -8511,7 +8883,7 @@
         <p:spPr/>
         <p:txBody>
           <a:bodyPr>
-            <a:normAutofit fontScale="92500"/>
+            <a:normAutofit fontScale="92500" lnSpcReduction="20000"/>
           </a:bodyPr>
           <a:lstStyle/>
           <a:p>
@@ -8544,6 +8916,9 @@
               <a:rPr lang="en-US" i="1" dirty="0" smtClean="0"/>
               <a:t>I spent an interesting evening recently with a grain of salt.“</a:t>
             </a:r>
+          </a:p>
+          <a:p>
+            <a:endParaRPr lang="en-CA" dirty="0" smtClean="0"/>
           </a:p>
           <a:p>
             <a:r>
@@ -9179,7 +9554,7 @@
             <a:pPr lvl="1"/>
             <a:r>
               <a:rPr lang="en-CA" dirty="0" smtClean="0"/>
-              <a:t>Technical details</a:t>
+              <a:t>Technical stuff</a:t>
             </a:r>
             <a:endParaRPr lang="en-US" dirty="0" smtClean="0"/>
           </a:p>
@@ -10551,7 +10926,7 @@
           </p:nvPr>
         </p:nvPicPr>
         <p:blipFill>
-          <a:blip r:embed="rId4" cstate="print"/>
+          <a:blip r:embed="rId3" cstate="print"/>
           <a:srcRect t="38573" b="56157"/>
           <a:stretch>
             <a:fillRect/>
@@ -10564,31 +10939,6 @@
           </a:xfrm>
         </p:spPr>
       </p:pic>
-      <p:pic>
-        <p:nvPicPr>
-          <p:cNvPr id="8" name="Content Placeholder 6" descr="pdf_convergence_adjusted2.eps"/>
-          <p:cNvPicPr>
-            <a:picLocks noChangeAspect="1"/>
-          </p:cNvPicPr>
-          <p:nvPr/>
-        </p:nvPicPr>
-        <p:blipFill>
-          <a:blip r:embed="rId4" cstate="print"/>
-          <a:srcRect l="63500" t="37255" r="26600" b="57474"/>
-          <a:stretch>
-            <a:fillRect/>
-          </a:stretch>
-        </p:blipFill>
-        <p:spPr>
-          <a:xfrm>
-            <a:off x="1205626" y="2780928"/>
-            <a:ext cx="6732748" cy="2448272"/>
-          </a:xfrm>
-          <a:prstGeom prst="rect">
-            <a:avLst/>
-          </a:prstGeom>
-        </p:spPr>
-      </p:pic>
       <p:grpSp>
         <p:nvGrpSpPr>
           <p:cNvPr id="423" name="Group 422"/>
@@ -10597,7 +10947,7 @@
         </p:nvGrpSpPr>
         <p:grpSpPr>
           <a:xfrm>
-            <a:off x="7524328" y="2852936"/>
+            <a:off x="6804248" y="3068960"/>
             <a:ext cx="573088" cy="284163"/>
             <a:chOff x="-74092" y="5674965"/>
             <a:chExt cx="573088" cy="284163"/>
@@ -13044,7 +13394,7 @@
         </p:nvGrpSpPr>
         <p:grpSpPr>
           <a:xfrm>
-            <a:off x="5220072" y="2780928"/>
+            <a:off x="4860032" y="2852936"/>
             <a:ext cx="573087" cy="284163"/>
             <a:chOff x="799034" y="5674965"/>
             <a:chExt cx="573087" cy="284163"/>
@@ -15294,7 +15644,7 @@
         </p:nvGrpSpPr>
         <p:grpSpPr>
           <a:xfrm>
-            <a:off x="2627784" y="3789040"/>
+            <a:off x="4860032" y="4509120"/>
             <a:ext cx="573087" cy="284163"/>
             <a:chOff x="1672159" y="5674965"/>
             <a:chExt cx="573087" cy="284163"/>
@@ -17639,7 +17989,7 @@
         </p:nvGrpSpPr>
         <p:grpSpPr>
           <a:xfrm>
-            <a:off x="4067944" y="4653136"/>
+            <a:off x="4427984" y="5805264"/>
             <a:ext cx="573088" cy="284163"/>
             <a:chOff x="2545284" y="5674965"/>
             <a:chExt cx="573088" cy="284163"/>
@@ -20081,7 +20431,7 @@
         </p:nvGrpSpPr>
         <p:grpSpPr>
           <a:xfrm>
-            <a:off x="2699792" y="4653136"/>
+            <a:off x="3275856" y="5877272"/>
             <a:ext cx="571500" cy="284163"/>
             <a:chOff x="3421584" y="5674965"/>
             <a:chExt cx="571500" cy="284163"/>
@@ -22312,7 +22662,7 @@
         </p:nvGrpSpPr>
         <p:grpSpPr>
           <a:xfrm>
-            <a:off x="5796136" y="3789040"/>
+            <a:off x="2843808" y="4725144"/>
             <a:ext cx="719138" cy="284163"/>
             <a:chOff x="5167834" y="5674965"/>
             <a:chExt cx="719138" cy="284163"/>
@@ -26093,13 +26443,15 @@
       <p:cxnSp>
         <p:nvCxnSpPr>
           <p:cNvPr id="431" name="Straight Connector 430"/>
-          <p:cNvCxnSpPr/>
+          <p:cNvCxnSpPr>
+            <a:stCxn id="434" idx="2"/>
+          </p:cNvCxnSpPr>
           <p:nvPr/>
         </p:nvCxnSpPr>
         <p:spPr>
           <a:xfrm flipH="1">
-            <a:off x="1115616" y="1700808"/>
-            <a:ext cx="4320480" cy="1080120"/>
+            <a:off x="2051720" y="1592796"/>
+            <a:ext cx="1800200" cy="684076"/>
           </a:xfrm>
           <a:prstGeom prst="line">
             <a:avLst/>
@@ -26123,13 +26475,15 @@
       <p:cxnSp>
         <p:nvCxnSpPr>
           <p:cNvPr id="433" name="Straight Connector 432"/>
-          <p:cNvCxnSpPr/>
+          <p:cNvCxnSpPr>
+            <a:stCxn id="434" idx="6"/>
+          </p:cNvCxnSpPr>
           <p:nvPr/>
         </p:nvCxnSpPr>
         <p:spPr>
           <a:xfrm>
-            <a:off x="6516216" y="1772816"/>
-            <a:ext cx="1728192" cy="936104"/>
+            <a:off x="4499992" y="1592796"/>
+            <a:ext cx="2376264" cy="684076"/>
           </a:xfrm>
           <a:prstGeom prst="line">
             <a:avLst/>
@@ -26158,8 +26512,8 @@
         </p:nvSpPr>
         <p:spPr>
           <a:xfrm>
-            <a:off x="5436096" y="1340768"/>
-            <a:ext cx="1152128" cy="504056"/>
+            <a:off x="3851920" y="1340768"/>
+            <a:ext cx="648072" cy="504056"/>
           </a:xfrm>
           <a:prstGeom prst="ellipse">
             <a:avLst/>
@@ -26195,6 +26549,31 @@
           </a:p>
         </p:txBody>
       </p:sp>
+      <p:pic>
+        <p:nvPicPr>
+          <p:cNvPr id="75" name="Content Placeholder 6" descr="pdf_convergence_adjusted2.eps"/>
+          <p:cNvPicPr>
+            <a:picLocks noChangeAspect="1"/>
+          </p:cNvPicPr>
+          <p:nvPr/>
+        </p:nvPicPr>
+        <p:blipFill>
+          <a:blip r:embed="rId3" cstate="print"/>
+          <a:srcRect l="41900" t="35937" r="51800" b="57475"/>
+          <a:stretch>
+            <a:fillRect/>
+          </a:stretch>
+        </p:blipFill>
+        <p:spPr>
+          <a:xfrm>
+            <a:off x="1475656" y="2276872"/>
+            <a:ext cx="6149484" cy="4392488"/>
+          </a:xfrm>
+          <a:prstGeom prst="rect">
+            <a:avLst/>
+          </a:prstGeom>
+        </p:spPr>
+      </p:pic>
     </p:spTree>
   </p:cSld>
   <p:clrMapOvr>
@@ -26264,7 +26643,9 @@
         </p:nvSpPr>
         <p:spPr/>
         <p:txBody>
-          <a:bodyPr/>
+          <a:bodyPr>
+            <a:normAutofit fontScale="92500" lnSpcReduction="20000"/>
+          </a:bodyPr>
           <a:lstStyle/>
           <a:p>
             <a:r>
@@ -26281,10 +26662,89 @@
             </a:r>
           </a:p>
           <a:p>
+            <a:endParaRPr lang="en-CA" dirty="0" smtClean="0">
+              <a:solidFill>
+                <a:srgbClr val="FF0000"/>
+              </a:solidFill>
+              <a:latin typeface="Courier New" pitchFamily="49" charset="0"/>
+              <a:cs typeface="Courier New" pitchFamily="49" charset="0"/>
+            </a:endParaRPr>
+          </a:p>
+          <a:p>
+            <a:endParaRPr lang="en-CA" dirty="0" smtClean="0">
+              <a:solidFill>
+                <a:srgbClr val="FF0000"/>
+              </a:solidFill>
+              <a:latin typeface="Courier New" pitchFamily="49" charset="0"/>
+              <a:cs typeface="Courier New" pitchFamily="49" charset="0"/>
+            </a:endParaRPr>
+          </a:p>
+          <a:p>
+            <a:endParaRPr lang="en-CA" dirty="0" smtClean="0">
+              <a:solidFill>
+                <a:srgbClr val="FF0000"/>
+              </a:solidFill>
+              <a:latin typeface="Courier New" pitchFamily="49" charset="0"/>
+              <a:cs typeface="Courier New" pitchFamily="49" charset="0"/>
+            </a:endParaRPr>
+          </a:p>
+          <a:p>
+            <a:endParaRPr lang="en-CA" dirty="0" smtClean="0">
+              <a:solidFill>
+                <a:srgbClr val="FF0000"/>
+              </a:solidFill>
+              <a:latin typeface="Courier New" pitchFamily="49" charset="0"/>
+              <a:cs typeface="Courier New" pitchFamily="49" charset="0"/>
+            </a:endParaRPr>
+          </a:p>
+          <a:p>
+            <a:pPr>
+              <a:buNone/>
+            </a:pPr>
+            <a:endParaRPr lang="en-CA" dirty="0" smtClean="0">
+              <a:solidFill>
+                <a:srgbClr val="FF0000"/>
+              </a:solidFill>
+              <a:latin typeface="Courier New" pitchFamily="49" charset="0"/>
+              <a:cs typeface="Courier New" pitchFamily="49" charset="0"/>
+            </a:endParaRPr>
+          </a:p>
+          <a:p>
+            <a:pPr>
+              <a:buNone/>
+            </a:pPr>
+            <a:r>
+              <a:rPr lang="en-CA" dirty="0" smtClean="0">
+                <a:solidFill>
+                  <a:srgbClr val="FF0000"/>
+                </a:solidFill>
+                <a:latin typeface="Courier New" pitchFamily="49" charset="0"/>
+                <a:cs typeface="Courier New" pitchFamily="49" charset="0"/>
+              </a:rPr>
+              <a:t> </a:t>
+            </a:r>
+            <a:endParaRPr lang="en-US" dirty="0" smtClean="0">
+              <a:solidFill>
+                <a:srgbClr val="FF0000"/>
+              </a:solidFill>
+              <a:latin typeface="Courier New" pitchFamily="49" charset="0"/>
+              <a:cs typeface="Courier New" pitchFamily="49" charset="0"/>
+            </a:endParaRPr>
+          </a:p>
+          <a:p>
+            <a:pPr>
+              <a:buNone/>
+            </a:pPr>
             <a:endParaRPr lang="en-CA" dirty="0" smtClean="0"/>
           </a:p>
           <a:p>
-            <a:endParaRPr lang="en-CA" dirty="0" smtClean="0"/>
+            <a:pPr>
+              <a:buNone/>
+            </a:pPr>
+            <a:r>
+              <a:rPr lang="en-CA" dirty="0" smtClean="0"/>
+              <a:t> </a:t>
+            </a:r>
           </a:p>
           <a:p>
             <a:pPr lvl="1"/>

</xml_diff>